<commit_message>
Add Kometa K-Means clustering in Lab1
</commit_message>
<xml_diff>
--- a/Lab1/Lab1.pptx
+++ b/Lab1/Lab1.pptx
@@ -21,9 +21,8 @@
     <p:sldId id="277" r:id="rId15"/>
     <p:sldId id="276" r:id="rId16"/>
     <p:sldId id="267" r:id="rId17"/>
-    <p:sldId id="268" r:id="rId18"/>
-    <p:sldId id="269" r:id="rId19"/>
-    <p:sldId id="270" r:id="rId20"/>
+    <p:sldId id="269" r:id="rId18"/>
+    <p:sldId id="268" r:id="rId19"/>
   </p:sldIdLst>
   <p:sldSz cx="12192000" cy="6858000"/>
   <p:notesSz cx="6858000" cy="9144000"/>
@@ -261,7 +260,7 @@
           <a:p>
             <a:fld id="{2BA96F12-51F3-4FE2-9D31-5E73840F9E12}" type="datetimeFigureOut">
               <a:rPr lang="uk-UA" smtClean="0"/>
-              <a:t>23.03.2022</a:t>
+              <a:t>26.03.2022</a:t>
             </a:fld>
             <a:endParaRPr lang="uk-UA"/>
           </a:p>
@@ -431,7 +430,7 @@
           <a:p>
             <a:fld id="{2BA96F12-51F3-4FE2-9D31-5E73840F9E12}" type="datetimeFigureOut">
               <a:rPr lang="uk-UA" smtClean="0"/>
-              <a:t>23.03.2022</a:t>
+              <a:t>26.03.2022</a:t>
             </a:fld>
             <a:endParaRPr lang="uk-UA"/>
           </a:p>
@@ -611,7 +610,7 @@
           <a:p>
             <a:fld id="{2BA96F12-51F3-4FE2-9D31-5E73840F9E12}" type="datetimeFigureOut">
               <a:rPr lang="uk-UA" smtClean="0"/>
-              <a:t>23.03.2022</a:t>
+              <a:t>26.03.2022</a:t>
             </a:fld>
             <a:endParaRPr lang="uk-UA"/>
           </a:p>
@@ -781,7 +780,7 @@
           <a:p>
             <a:fld id="{2BA96F12-51F3-4FE2-9D31-5E73840F9E12}" type="datetimeFigureOut">
               <a:rPr lang="uk-UA" smtClean="0"/>
-              <a:t>23.03.2022</a:t>
+              <a:t>26.03.2022</a:t>
             </a:fld>
             <a:endParaRPr lang="uk-UA"/>
           </a:p>
@@ -1027,7 +1026,7 @@
           <a:p>
             <a:fld id="{2BA96F12-51F3-4FE2-9D31-5E73840F9E12}" type="datetimeFigureOut">
               <a:rPr lang="uk-UA" smtClean="0"/>
-              <a:t>23.03.2022</a:t>
+              <a:t>26.03.2022</a:t>
             </a:fld>
             <a:endParaRPr lang="uk-UA"/>
           </a:p>
@@ -1259,7 +1258,7 @@
           <a:p>
             <a:fld id="{2BA96F12-51F3-4FE2-9D31-5E73840F9E12}" type="datetimeFigureOut">
               <a:rPr lang="uk-UA" smtClean="0"/>
-              <a:t>23.03.2022</a:t>
+              <a:t>26.03.2022</a:t>
             </a:fld>
             <a:endParaRPr lang="uk-UA"/>
           </a:p>
@@ -1626,7 +1625,7 @@
           <a:p>
             <a:fld id="{2BA96F12-51F3-4FE2-9D31-5E73840F9E12}" type="datetimeFigureOut">
               <a:rPr lang="uk-UA" smtClean="0"/>
-              <a:t>23.03.2022</a:t>
+              <a:t>26.03.2022</a:t>
             </a:fld>
             <a:endParaRPr lang="uk-UA"/>
           </a:p>
@@ -1744,7 +1743,7 @@
           <a:p>
             <a:fld id="{2BA96F12-51F3-4FE2-9D31-5E73840F9E12}" type="datetimeFigureOut">
               <a:rPr lang="uk-UA" smtClean="0"/>
-              <a:t>23.03.2022</a:t>
+              <a:t>26.03.2022</a:t>
             </a:fld>
             <a:endParaRPr lang="uk-UA"/>
           </a:p>
@@ -1839,7 +1838,7 @@
           <a:p>
             <a:fld id="{2BA96F12-51F3-4FE2-9D31-5E73840F9E12}" type="datetimeFigureOut">
               <a:rPr lang="uk-UA" smtClean="0"/>
-              <a:t>23.03.2022</a:t>
+              <a:t>26.03.2022</a:t>
             </a:fld>
             <a:endParaRPr lang="uk-UA"/>
           </a:p>
@@ -2116,7 +2115,7 @@
           <a:p>
             <a:fld id="{2BA96F12-51F3-4FE2-9D31-5E73840F9E12}" type="datetimeFigureOut">
               <a:rPr lang="uk-UA" smtClean="0"/>
-              <a:t>23.03.2022</a:t>
+              <a:t>26.03.2022</a:t>
             </a:fld>
             <a:endParaRPr lang="uk-UA"/>
           </a:p>
@@ -2369,7 +2368,7 @@
           <a:p>
             <a:fld id="{2BA96F12-51F3-4FE2-9D31-5E73840F9E12}" type="datetimeFigureOut">
               <a:rPr lang="uk-UA" smtClean="0"/>
-              <a:t>23.03.2022</a:t>
+              <a:t>26.03.2022</a:t>
             </a:fld>
             <a:endParaRPr lang="uk-UA"/>
           </a:p>
@@ -2582,7 +2581,7 @@
           <a:p>
             <a:fld id="{2BA96F12-51F3-4FE2-9D31-5E73840F9E12}" type="datetimeFigureOut">
               <a:rPr lang="uk-UA" smtClean="0"/>
-              <a:t>23.03.2022</a:t>
+              <a:t>26.03.2022</a:t>
             </a:fld>
             <a:endParaRPr lang="uk-UA"/>
           </a:p>
@@ -4494,6 +4493,93 @@
           <a:chExt cx="0" cy="0"/>
         </a:xfrm>
       </p:grpSpPr>
+      <p:pic>
+        <p:nvPicPr>
+          <p:cNvPr id="2" name="Рисунок 1"/>
+          <p:cNvPicPr>
+            <a:picLocks noChangeAspect="1"/>
+          </p:cNvPicPr>
+          <p:nvPr/>
+        </p:nvPicPr>
+        <p:blipFill rotWithShape="1">
+          <a:blip r:embed="rId2"/>
+          <a:srcRect l="6849" t="10400" r="8700" b="5800"/>
+          <a:stretch/>
+        </p:blipFill>
+        <p:spPr>
+          <a:xfrm>
+            <a:off x="2889504" y="1925080"/>
+            <a:ext cx="6382512" cy="4750040"/>
+          </a:xfrm>
+          <a:prstGeom prst="rect">
+            <a:avLst/>
+          </a:prstGeom>
+        </p:spPr>
+      </p:pic>
+      <p:sp>
+        <p:nvSpPr>
+          <p:cNvPr id="3" name="TextBox 2"/>
+          <p:cNvSpPr txBox="1"/>
+          <p:nvPr/>
+        </p:nvSpPr>
+        <p:spPr>
+          <a:xfrm>
+            <a:off x="701109" y="144437"/>
+            <a:ext cx="11246412" cy="1446550"/>
+          </a:xfrm>
+          <a:prstGeom prst="rect">
+            <a:avLst/>
+          </a:prstGeom>
+          <a:noFill/>
+        </p:spPr>
+        <p:txBody>
+          <a:bodyPr wrap="none" rtlCol="0">
+            <a:spAutoFit/>
+          </a:bodyPr>
+          <a:lstStyle/>
+          <a:p>
+            <a:pPr algn="ctr"/>
+            <a:r>
+              <a:rPr lang="en-US" sz="4400" b="1">
+                <a:latin typeface="Arial" panose="020B0604020202020204" pitchFamily="34" charset="0"/>
+                <a:cs typeface="Arial" panose="020B0604020202020204" pitchFamily="34" charset="0"/>
+              </a:rPr>
+              <a:t>Visualizing iterations of </a:t>
+            </a:r>
+            <a:r>
+              <a:rPr lang="en-US" sz="4400" b="1">
+                <a:latin typeface="Arial" panose="020B0604020202020204" pitchFamily="34" charset="0"/>
+                <a:cs typeface="Arial" panose="020B0604020202020204" pitchFamily="34" charset="0"/>
+              </a:rPr>
+              <a:t>Kometa </a:t>
+            </a:r>
+            <a:r>
+              <a:rPr lang="en-US" sz="4400" b="1" smtClean="0">
+                <a:latin typeface="Arial" panose="020B0604020202020204" pitchFamily="34" charset="0"/>
+                <a:cs typeface="Arial" panose="020B0604020202020204" pitchFamily="34" charset="0"/>
+              </a:rPr>
+              <a:t>K-Means</a:t>
+            </a:r>
+          </a:p>
+          <a:p>
+            <a:pPr algn="ctr"/>
+            <a:r>
+              <a:rPr lang="en-US" sz="4400" b="1" smtClean="0">
+                <a:latin typeface="Arial" panose="020B0604020202020204" pitchFamily="34" charset="0"/>
+                <a:cs typeface="Arial" panose="020B0604020202020204" pitchFamily="34" charset="0"/>
+              </a:rPr>
+              <a:t>(Slow </a:t>
+            </a:r>
+            <a:r>
+              <a:rPr lang="en-US" sz="4400" b="1">
+                <a:latin typeface="Arial" panose="020B0604020202020204" pitchFamily="34" charset="0"/>
+                <a:cs typeface="Arial" panose="020B0604020202020204" pitchFamily="34" charset="0"/>
+              </a:rPr>
+              <a:t>K-Means)</a:t>
+            </a:r>
+          </a:p>
+        </p:txBody>
+      </p:sp>
     </p:spTree>
     <p:extLst>
       <p:ext uri="{BB962C8B-B14F-4D97-AF65-F5344CB8AC3E}">
@@ -4524,16 +4610,576 @@
           <a:chExt cx="0" cy="0"/>
         </a:xfrm>
       </p:grpSpPr>
+      <p:sp>
+        <p:nvSpPr>
+          <p:cNvPr id="2" name="TextBox 1"/>
+          <p:cNvSpPr txBox="1"/>
+          <p:nvPr/>
+        </p:nvSpPr>
+        <p:spPr>
+          <a:xfrm>
+            <a:off x="701109" y="144437"/>
+            <a:ext cx="11246412" cy="1446550"/>
+          </a:xfrm>
+          <a:prstGeom prst="rect">
+            <a:avLst/>
+          </a:prstGeom>
+          <a:noFill/>
+        </p:spPr>
+        <p:txBody>
+          <a:bodyPr wrap="none" rtlCol="0">
+            <a:spAutoFit/>
+          </a:bodyPr>
+          <a:lstStyle/>
+          <a:p>
+            <a:pPr algn="ctr"/>
+            <a:r>
+              <a:rPr lang="en-US" sz="4400" b="1">
+                <a:latin typeface="Arial" panose="020B0604020202020204" pitchFamily="34" charset="0"/>
+                <a:cs typeface="Arial" panose="020B0604020202020204" pitchFamily="34" charset="0"/>
+              </a:rPr>
+              <a:t>Visualizing iterations of </a:t>
+            </a:r>
+            <a:r>
+              <a:rPr lang="en-US" sz="4400" b="1">
+                <a:latin typeface="Arial" panose="020B0604020202020204" pitchFamily="34" charset="0"/>
+                <a:cs typeface="Arial" panose="020B0604020202020204" pitchFamily="34" charset="0"/>
+              </a:rPr>
+              <a:t>Kometa </a:t>
+            </a:r>
+            <a:r>
+              <a:rPr lang="en-US" sz="4400" b="1" smtClean="0">
+                <a:latin typeface="Arial" panose="020B0604020202020204" pitchFamily="34" charset="0"/>
+                <a:cs typeface="Arial" panose="020B0604020202020204" pitchFamily="34" charset="0"/>
+              </a:rPr>
+              <a:t>K-Means</a:t>
+            </a:r>
+          </a:p>
+          <a:p>
+            <a:pPr algn="ctr"/>
+            <a:r>
+              <a:rPr lang="en-US" sz="4400" b="1" smtClean="0">
+                <a:latin typeface="Arial" panose="020B0604020202020204" pitchFamily="34" charset="0"/>
+                <a:cs typeface="Arial" panose="020B0604020202020204" pitchFamily="34" charset="0"/>
+              </a:rPr>
+              <a:t>(Slow </a:t>
+            </a:r>
+            <a:r>
+              <a:rPr lang="en-US" sz="4400" b="1">
+                <a:latin typeface="Arial" panose="020B0604020202020204" pitchFamily="34" charset="0"/>
+                <a:cs typeface="Arial" panose="020B0604020202020204" pitchFamily="34" charset="0"/>
+              </a:rPr>
+              <a:t>K-Means)</a:t>
+            </a:r>
+          </a:p>
+        </p:txBody>
+      </p:sp>
+      <p:sp>
+        <p:nvSpPr>
+          <p:cNvPr id="3" name="TextBox 2"/>
+          <p:cNvSpPr txBox="1"/>
+          <p:nvPr/>
+        </p:nvSpPr>
+        <p:spPr>
+          <a:xfrm>
+            <a:off x="1417320" y="1655064"/>
+            <a:ext cx="2443298" cy="769441"/>
+          </a:xfrm>
+          <a:prstGeom prst="rect">
+            <a:avLst/>
+          </a:prstGeom>
+          <a:noFill/>
+        </p:spPr>
+        <p:txBody>
+          <a:bodyPr wrap="none" rtlCol="0">
+            <a:spAutoFit/>
+          </a:bodyPr>
+          <a:lstStyle/>
+          <a:p>
+            <a:r>
+              <a:rPr lang="en-US" sz="4400" smtClean="0">
+                <a:latin typeface="Arial" panose="020B0604020202020204" pitchFamily="34" charset="0"/>
+                <a:cs typeface="Arial" panose="020B0604020202020204" pitchFamily="34" charset="0"/>
+              </a:rPr>
+              <a:t>K-Means</a:t>
+            </a:r>
+            <a:endParaRPr lang="uk-UA" sz="4400">
+              <a:latin typeface="Arial" panose="020B0604020202020204" pitchFamily="34" charset="0"/>
+              <a:cs typeface="Arial" panose="020B0604020202020204" pitchFamily="34" charset="0"/>
+            </a:endParaRPr>
+          </a:p>
+        </p:txBody>
+      </p:sp>
+      <p:sp>
+        <p:nvSpPr>
+          <p:cNvPr id="4" name="TextBox 3"/>
+          <p:cNvSpPr txBox="1"/>
+          <p:nvPr/>
+        </p:nvSpPr>
+        <p:spPr>
+          <a:xfrm>
+            <a:off x="6608064" y="1655064"/>
+            <a:ext cx="4546437" cy="769441"/>
+          </a:xfrm>
+          <a:prstGeom prst="rect">
+            <a:avLst/>
+          </a:prstGeom>
+          <a:noFill/>
+        </p:spPr>
+        <p:txBody>
+          <a:bodyPr wrap="none" rtlCol="0">
+            <a:spAutoFit/>
+          </a:bodyPr>
+          <a:lstStyle/>
+          <a:p>
+            <a:r>
+              <a:rPr lang="en-US" sz="4400" smtClean="0">
+                <a:latin typeface="Arial" panose="020B0604020202020204" pitchFamily="34" charset="0"/>
+                <a:cs typeface="Arial" panose="020B0604020202020204" pitchFamily="34" charset="0"/>
+              </a:rPr>
+              <a:t>Kometa K-Means</a:t>
+            </a:r>
+            <a:endParaRPr lang="uk-UA" sz="4400">
+              <a:latin typeface="Arial" panose="020B0604020202020204" pitchFamily="34" charset="0"/>
+              <a:cs typeface="Arial" panose="020B0604020202020204" pitchFamily="34" charset="0"/>
+            </a:endParaRPr>
+          </a:p>
+        </p:txBody>
+      </p:sp>
+      <p:sp>
+        <p:nvSpPr>
+          <p:cNvPr id="5" name="TextBox 4"/>
+          <p:cNvSpPr txBox="1"/>
+          <p:nvPr/>
+        </p:nvSpPr>
+        <p:spPr>
+          <a:xfrm>
+            <a:off x="164592" y="3072384"/>
+            <a:ext cx="5074920" cy="523220"/>
+          </a:xfrm>
+          <a:prstGeom prst="rect">
+            <a:avLst/>
+          </a:prstGeom>
+          <a:noFill/>
+        </p:spPr>
+        <p:txBody>
+          <a:bodyPr wrap="square" rtlCol="0">
+            <a:spAutoFit/>
+          </a:bodyPr>
+          <a:lstStyle/>
+          <a:p>
+            <a:pPr algn="just"/>
+            <a:r>
+              <a:rPr lang="en-US" sz="2800" b="1" smtClean="0">
+                <a:latin typeface="Arial" panose="020B0604020202020204" pitchFamily="34" charset="0"/>
+                <a:cs typeface="Arial" panose="020B0604020202020204" pitchFamily="34" charset="0"/>
+              </a:rPr>
+              <a:t>Centroid = average of custer</a:t>
+            </a:r>
+            <a:endParaRPr lang="uk-UA" sz="2800" b="1">
+              <a:latin typeface="Arial" panose="020B0604020202020204" pitchFamily="34" charset="0"/>
+              <a:cs typeface="Arial" panose="020B0604020202020204" pitchFamily="34" charset="0"/>
+            </a:endParaRPr>
+          </a:p>
+        </p:txBody>
+      </p:sp>
+      <mc:AlternateContent xmlns:mc="http://schemas.openxmlformats.org/markup-compatibility/2006">
+        <mc:Choice xmlns:a14="http://schemas.microsoft.com/office/drawing/2010/main" Requires="a14">
+          <p:sp>
+            <p:nvSpPr>
+              <p:cNvPr id="6" name="TextBox 5"/>
+              <p:cNvSpPr txBox="1"/>
+              <p:nvPr/>
+            </p:nvSpPr>
+            <p:spPr>
+              <a:xfrm>
+                <a:off x="5894832" y="2720748"/>
+                <a:ext cx="5687568" cy="2246769"/>
+              </a:xfrm>
+              <a:prstGeom prst="rect">
+                <a:avLst/>
+              </a:prstGeom>
+              <a:noFill/>
+            </p:spPr>
+            <p:txBody>
+              <a:bodyPr wrap="square" rtlCol="0">
+                <a:spAutoFit/>
+              </a:bodyPr>
+              <a:lstStyle/>
+              <a:p>
+                <a:pPr algn="just"/>
+                <a:r>
+                  <a:rPr lang="en-US" sz="2800" b="1" smtClean="0">
+                    <a:latin typeface="Arial" panose="020B0604020202020204" pitchFamily="34" charset="0"/>
+                    <a:cs typeface="Arial" panose="020B0604020202020204" pitchFamily="34" charset="0"/>
+                  </a:rPr>
+                  <a:t>Let A = old cetroid</a:t>
+                </a:r>
+              </a:p>
+              <a:p>
+                <a:pPr algn="just"/>
+                <a:r>
+                  <a:rPr lang="en-US" sz="2800" b="1" smtClean="0">
+                    <a:latin typeface="Arial" panose="020B0604020202020204" pitchFamily="34" charset="0"/>
+                    <a:cs typeface="Arial" panose="020B0604020202020204" pitchFamily="34" charset="0"/>
+                  </a:rPr>
+                  <a:t>Let B = average of custer</a:t>
+                </a:r>
+              </a:p>
+              <a:p>
+                <a:pPr algn="just"/>
+                <a:endParaRPr lang="en-US" sz="2800" b="1">
+                  <a:latin typeface="Arial" panose="020B0604020202020204" pitchFamily="34" charset="0"/>
+                  <a:cs typeface="Arial" panose="020B0604020202020204" pitchFamily="34" charset="0"/>
+                </a:endParaRPr>
+              </a:p>
+              <a:p>
+                <a:pPr algn="just"/>
+                <a:r>
+                  <a:rPr lang="en-US" sz="2800" b="1" smtClean="0">
+                    <a:latin typeface="Arial" panose="020B0604020202020204" pitchFamily="34" charset="0"/>
+                    <a:cs typeface="Arial" panose="020B0604020202020204" pitchFamily="34" charset="0"/>
+                  </a:rPr>
+                  <a:t>Centroid = </a:t>
+                </a:r>
+                <a14:m>
+                  <m:oMath xmlns:m="http://schemas.openxmlformats.org/officeDocument/2006/math">
+                    <m:d>
+                      <m:dPr>
+                        <m:ctrlPr>
+                          <a:rPr lang="en-US" sz="2800" b="1" i="0" smtClean="0">
+                            <a:latin typeface="Cambria Math" panose="02040503050406030204" pitchFamily="18" charset="0"/>
+                            <a:ea typeface="Cambria Math" panose="02040503050406030204" pitchFamily="18" charset="0"/>
+                            <a:cs typeface="Arial" panose="020B0604020202020204" pitchFamily="34" charset="0"/>
+                          </a:rPr>
+                        </m:ctrlPr>
+                      </m:dPr>
+                      <m:e>
+                        <m:r>
+                          <a:rPr lang="en-US" sz="2800" b="1" i="0" smtClean="0">
+                            <a:latin typeface="Cambria Math" panose="02040503050406030204" pitchFamily="18" charset="0"/>
+                            <a:ea typeface="Cambria Math" panose="02040503050406030204" pitchFamily="18" charset="0"/>
+                            <a:cs typeface="Arial" panose="020B0604020202020204" pitchFamily="34" charset="0"/>
+                          </a:rPr>
+                          <m:t>𝟏</m:t>
+                        </m:r>
+                        <m:r>
+                          <a:rPr lang="en-US" sz="2800" b="1" i="0" smtClean="0">
+                            <a:latin typeface="Cambria Math" panose="02040503050406030204" pitchFamily="18" charset="0"/>
+                            <a:ea typeface="Cambria Math" panose="02040503050406030204" pitchFamily="18" charset="0"/>
+                            <a:cs typeface="Arial" panose="020B0604020202020204" pitchFamily="34" charset="0"/>
+                          </a:rPr>
+                          <m:t>−</m:t>
+                        </m:r>
+                        <m:r>
+                          <a:rPr lang="en-US" sz="2800" b="1" i="1" smtClean="0">
+                            <a:latin typeface="Cambria Math" panose="02040503050406030204" pitchFamily="18" charset="0"/>
+                            <a:ea typeface="Cambria Math" panose="02040503050406030204" pitchFamily="18" charset="0"/>
+                            <a:cs typeface="Arial" panose="020B0604020202020204" pitchFamily="34" charset="0"/>
+                          </a:rPr>
+                          <m:t>𝜶</m:t>
+                        </m:r>
+                      </m:e>
+                    </m:d>
+                    <m:r>
+                      <a:rPr lang="en-US" sz="2800" b="1" i="1" smtClean="0">
+                        <a:latin typeface="Cambria Math" panose="02040503050406030204" pitchFamily="18" charset="0"/>
+                        <a:ea typeface="Cambria Math" panose="02040503050406030204" pitchFamily="18" charset="0"/>
+                        <a:cs typeface="Arial" panose="020B0604020202020204" pitchFamily="34" charset="0"/>
+                      </a:rPr>
+                      <m:t>∗</m:t>
+                    </m:r>
+                    <m:r>
+                      <a:rPr lang="en-US" sz="2800" b="1" i="1" smtClean="0">
+                        <a:latin typeface="Cambria Math" panose="02040503050406030204" pitchFamily="18" charset="0"/>
+                        <a:ea typeface="Cambria Math" panose="02040503050406030204" pitchFamily="18" charset="0"/>
+                        <a:cs typeface="Arial" panose="020B0604020202020204" pitchFamily="34" charset="0"/>
+                      </a:rPr>
+                      <m:t>𝑨</m:t>
+                    </m:r>
+                    <m:r>
+                      <a:rPr lang="en-US" sz="2800" b="1" i="1" smtClean="0">
+                        <a:latin typeface="Cambria Math" panose="02040503050406030204" pitchFamily="18" charset="0"/>
+                        <a:ea typeface="Cambria Math" panose="02040503050406030204" pitchFamily="18" charset="0"/>
+                        <a:cs typeface="Arial" panose="020B0604020202020204" pitchFamily="34" charset="0"/>
+                      </a:rPr>
+                      <m:t>+</m:t>
+                    </m:r>
+                    <m:r>
+                      <a:rPr lang="en-US" sz="2800" b="1" i="1">
+                        <a:latin typeface="Cambria Math" panose="02040503050406030204" pitchFamily="18" charset="0"/>
+                        <a:ea typeface="Cambria Math" panose="02040503050406030204" pitchFamily="18" charset="0"/>
+                        <a:cs typeface="Arial" panose="020B0604020202020204" pitchFamily="34" charset="0"/>
+                      </a:rPr>
+                      <m:t>𝜶</m:t>
+                    </m:r>
+                    <m:r>
+                      <a:rPr lang="en-US" sz="2800" b="1" i="1" smtClean="0">
+                        <a:latin typeface="Cambria Math" panose="02040503050406030204" pitchFamily="18" charset="0"/>
+                        <a:ea typeface="Cambria Math" panose="02040503050406030204" pitchFamily="18" charset="0"/>
+                        <a:cs typeface="Arial" panose="020B0604020202020204" pitchFamily="34" charset="0"/>
+                      </a:rPr>
+                      <m:t>∗</m:t>
+                    </m:r>
+                    <m:r>
+                      <a:rPr lang="en-US" sz="2800" b="1" i="1" smtClean="0">
+                        <a:latin typeface="Cambria Math" panose="02040503050406030204" pitchFamily="18" charset="0"/>
+                        <a:ea typeface="Cambria Math" panose="02040503050406030204" pitchFamily="18" charset="0"/>
+                        <a:cs typeface="Arial" panose="020B0604020202020204" pitchFamily="34" charset="0"/>
+                      </a:rPr>
+                      <m:t>𝑩</m:t>
+                    </m:r>
+                  </m:oMath>
+                </a14:m>
+                <a:endParaRPr lang="en-US" sz="2800" b="1" smtClean="0">
+                  <a:latin typeface="Arial" panose="020B0604020202020204" pitchFamily="34" charset="0"/>
+                  <a:cs typeface="Arial" panose="020B0604020202020204" pitchFamily="34" charset="0"/>
+                </a:endParaRPr>
+              </a:p>
+              <a:p>
+                <a:pPr algn="just"/>
+                <a14:m>
+                  <m:oMathPara xmlns:m="http://schemas.openxmlformats.org/officeDocument/2006/math">
+                    <m:oMathParaPr>
+                      <m:jc m:val="left"/>
+                    </m:oMathParaPr>
+                    <m:oMath xmlns:m="http://schemas.openxmlformats.org/officeDocument/2006/math">
+                      <m:r>
+                        <a:rPr lang="en-US" sz="2800" b="1" i="1">
+                          <a:latin typeface="Cambria Math" panose="02040503050406030204" pitchFamily="18" charset="0"/>
+                          <a:ea typeface="Cambria Math" panose="02040503050406030204" pitchFamily="18" charset="0"/>
+                          <a:cs typeface="Arial" panose="020B0604020202020204" pitchFamily="34" charset="0"/>
+                        </a:rPr>
+                        <m:t>𝜶</m:t>
+                      </m:r>
+                      <m:r>
+                        <a:rPr lang="en-US" sz="2800" b="1" i="1" smtClean="0">
+                          <a:latin typeface="Cambria Math" panose="02040503050406030204" pitchFamily="18" charset="0"/>
+                          <a:ea typeface="Cambria Math" panose="02040503050406030204" pitchFamily="18" charset="0"/>
+                          <a:cs typeface="Arial" panose="020B0604020202020204" pitchFamily="34" charset="0"/>
+                        </a:rPr>
+                        <m:t> ~ </m:t>
+                      </m:r>
+                      <m:r>
+                        <a:rPr lang="en-US" sz="2800" b="1" i="1" smtClean="0">
+                          <a:latin typeface="Cambria Math" panose="02040503050406030204" pitchFamily="18" charset="0"/>
+                          <a:ea typeface="Cambria Math" panose="02040503050406030204" pitchFamily="18" charset="0"/>
+                          <a:cs typeface="Arial" panose="020B0604020202020204" pitchFamily="34" charset="0"/>
+                        </a:rPr>
+                        <m:t>𝟎</m:t>
+                      </m:r>
+                      <m:r>
+                        <a:rPr lang="en-US" sz="2800" b="1" i="1" smtClean="0">
+                          <a:latin typeface="Cambria Math" panose="02040503050406030204" pitchFamily="18" charset="0"/>
+                          <a:ea typeface="Cambria Math" panose="02040503050406030204" pitchFamily="18" charset="0"/>
+                          <a:cs typeface="Arial" panose="020B0604020202020204" pitchFamily="34" charset="0"/>
+                        </a:rPr>
+                        <m:t>.</m:t>
+                      </m:r>
+                      <m:r>
+                        <a:rPr lang="en-US" sz="2800" b="1" i="1" smtClean="0">
+                          <a:latin typeface="Cambria Math" panose="02040503050406030204" pitchFamily="18" charset="0"/>
+                          <a:ea typeface="Cambria Math" panose="02040503050406030204" pitchFamily="18" charset="0"/>
+                          <a:cs typeface="Arial" panose="020B0604020202020204" pitchFamily="34" charset="0"/>
+                        </a:rPr>
+                        <m:t>𝟏</m:t>
+                      </m:r>
+                      <m:r>
+                        <a:rPr lang="en-US" sz="2800" b="1" i="1" smtClean="0">
+                          <a:latin typeface="Cambria Math" panose="02040503050406030204" pitchFamily="18" charset="0"/>
+                          <a:ea typeface="Cambria Math" panose="02040503050406030204" pitchFamily="18" charset="0"/>
+                          <a:cs typeface="Arial" panose="020B0604020202020204" pitchFamily="34" charset="0"/>
+                        </a:rPr>
+                        <m:t> (</m:t>
+                      </m:r>
+                      <m:r>
+                        <a:rPr lang="en-US" sz="2800" b="1" i="1" smtClean="0">
+                          <a:latin typeface="Cambria Math" panose="02040503050406030204" pitchFamily="18" charset="0"/>
+                          <a:ea typeface="Cambria Math" panose="02040503050406030204" pitchFamily="18" charset="0"/>
+                          <a:cs typeface="Arial" panose="020B0604020202020204" pitchFamily="34" charset="0"/>
+                        </a:rPr>
+                        <m:t>𝒇𝒐𝒓</m:t>
+                      </m:r>
+                      <m:r>
+                        <a:rPr lang="en-US" sz="2800" b="1" i="1" smtClean="0">
+                          <a:latin typeface="Cambria Math" panose="02040503050406030204" pitchFamily="18" charset="0"/>
+                          <a:ea typeface="Cambria Math" panose="02040503050406030204" pitchFamily="18" charset="0"/>
+                          <a:cs typeface="Arial" panose="020B0604020202020204" pitchFamily="34" charset="0"/>
+                        </a:rPr>
+                        <m:t> </m:t>
+                      </m:r>
+                      <m:r>
+                        <a:rPr lang="en-US" sz="2800" b="1" i="1" smtClean="0">
+                          <a:latin typeface="Cambria Math" panose="02040503050406030204" pitchFamily="18" charset="0"/>
+                          <a:ea typeface="Cambria Math" panose="02040503050406030204" pitchFamily="18" charset="0"/>
+                          <a:cs typeface="Arial" panose="020B0604020202020204" pitchFamily="34" charset="0"/>
+                        </a:rPr>
+                        <m:t>𝒆𝒙𝒂𝒎𝒑𝒍𝒆</m:t>
+                      </m:r>
+                      <m:r>
+                        <a:rPr lang="en-US" sz="2800" b="1" i="1" smtClean="0">
+                          <a:latin typeface="Cambria Math" panose="02040503050406030204" pitchFamily="18" charset="0"/>
+                          <a:ea typeface="Cambria Math" panose="02040503050406030204" pitchFamily="18" charset="0"/>
+                          <a:cs typeface="Arial" panose="020B0604020202020204" pitchFamily="34" charset="0"/>
+                        </a:rPr>
+                        <m:t>)</m:t>
+                      </m:r>
+                    </m:oMath>
+                  </m:oMathPara>
+                </a14:m>
+                <a:endParaRPr lang="en-US" sz="2800" b="1">
+                  <a:latin typeface="Arial" panose="020B0604020202020204" pitchFamily="34" charset="0"/>
+                  <a:cs typeface="Arial" panose="020B0604020202020204" pitchFamily="34" charset="0"/>
+                </a:endParaRPr>
+              </a:p>
+            </p:txBody>
+          </p:sp>
+        </mc:Choice>
+        <mc:Fallback>
+          <p:sp>
+            <p:nvSpPr>
+              <p:cNvPr id="6" name="TextBox 5"/>
+              <p:cNvSpPr txBox="1">
+                <a:spLocks noRot="1" noChangeAspect="1" noMove="1" noResize="1" noEditPoints="1" noAdjustHandles="1" noChangeArrowheads="1" noChangeShapeType="1" noTextEdit="1"/>
+              </p:cNvSpPr>
+              <p:nvPr/>
+            </p:nvSpPr>
+            <p:spPr>
+              <a:xfrm>
+                <a:off x="5894832" y="2720748"/>
+                <a:ext cx="5687568" cy="2246769"/>
+              </a:xfrm>
+              <a:prstGeom prst="rect">
+                <a:avLst/>
+              </a:prstGeom>
+              <a:blipFill rotWithShape="0">
+                <a:blip r:embed="rId2"/>
+                <a:stretch>
+                  <a:fillRect l="-2144" t="-2710"/>
+                </a:stretch>
+              </a:blipFill>
+            </p:spPr>
+            <p:txBody>
+              <a:bodyPr/>
+              <a:lstStyle/>
+              <a:p>
+                <a:r>
+                  <a:rPr lang="uk-UA">
+                    <a:noFill/>
+                  </a:rPr>
+                  <a:t> </a:t>
+                </a:r>
+              </a:p>
+            </p:txBody>
+          </p:sp>
+        </mc:Fallback>
+      </mc:AlternateContent>
+      <p:sp>
+        <p:nvSpPr>
+          <p:cNvPr id="7" name="TextBox 6"/>
+          <p:cNvSpPr txBox="1"/>
+          <p:nvPr/>
+        </p:nvSpPr>
+        <p:spPr>
+          <a:xfrm>
+            <a:off x="2702052" y="5376672"/>
+            <a:ext cx="6732933" cy="954107"/>
+          </a:xfrm>
+          <a:prstGeom prst="rect">
+            <a:avLst/>
+          </a:prstGeom>
+          <a:noFill/>
+        </p:spPr>
+        <p:txBody>
+          <a:bodyPr wrap="none" rtlCol="0">
+            <a:spAutoFit/>
+          </a:bodyPr>
+          <a:lstStyle/>
+          <a:p>
+            <a:pPr marL="285750" indent="-285750">
+              <a:buFont typeface="Arial" panose="020B0604020202020204" pitchFamily="34" charset="0"/>
+              <a:buChar char="•"/>
+            </a:pPr>
+            <a:r>
+              <a:rPr lang="en-US" sz="2800" smtClean="0">
+                <a:solidFill>
+                  <a:srgbClr val="FF0000"/>
+                </a:solidFill>
+                <a:latin typeface="Arial" panose="020B0604020202020204" pitchFamily="34" charset="0"/>
+                <a:cs typeface="Arial" panose="020B0604020202020204" pitchFamily="34" charset="0"/>
+              </a:rPr>
+              <a:t>Algorithm slower than original K-Means</a:t>
+            </a:r>
+            <a:endParaRPr lang="uk-UA" sz="2800" smtClean="0">
+              <a:solidFill>
+                <a:srgbClr val="FF0000"/>
+              </a:solidFill>
+              <a:latin typeface="Arial" panose="020B0604020202020204" pitchFamily="34" charset="0"/>
+              <a:cs typeface="Arial" panose="020B0604020202020204" pitchFamily="34" charset="0"/>
+            </a:endParaRPr>
+          </a:p>
+          <a:p>
+            <a:pPr marL="285750" indent="-285750">
+              <a:buFont typeface="Arial" panose="020B0604020202020204" pitchFamily="34" charset="0"/>
+              <a:buChar char="•"/>
+            </a:pPr>
+            <a:r>
+              <a:rPr lang="en-US" sz="2800" smtClean="0">
+                <a:solidFill>
+                  <a:srgbClr val="00B050"/>
+                </a:solidFill>
+                <a:latin typeface="Arial" panose="020B0604020202020204" pitchFamily="34" charset="0"/>
+                <a:cs typeface="Arial" panose="020B0604020202020204" pitchFamily="34" charset="0"/>
+              </a:rPr>
+              <a:t>Centroids </a:t>
+            </a:r>
+            <a:r>
+              <a:rPr lang="en-US" sz="2800">
+                <a:solidFill>
+                  <a:srgbClr val="00B050"/>
+                </a:solidFill>
+                <a:latin typeface="Arial" panose="020B0604020202020204" pitchFamily="34" charset="0"/>
+                <a:cs typeface="Arial" panose="020B0604020202020204" pitchFamily="34" charset="0"/>
+              </a:rPr>
+              <a:t>move </a:t>
+            </a:r>
+            <a:r>
+              <a:rPr lang="en-US" sz="2800" smtClean="0">
+                <a:solidFill>
+                  <a:srgbClr val="00B050"/>
+                </a:solidFill>
+                <a:latin typeface="Arial" panose="020B0604020202020204" pitchFamily="34" charset="0"/>
+                <a:cs typeface="Arial" panose="020B0604020202020204" pitchFamily="34" charset="0"/>
+              </a:rPr>
+              <a:t>smoothly</a:t>
+            </a:r>
+            <a:endParaRPr lang="uk-UA" sz="2800" smtClean="0">
+              <a:solidFill>
+                <a:srgbClr val="00B050"/>
+              </a:solidFill>
+              <a:latin typeface="Arial" panose="020B0604020202020204" pitchFamily="34" charset="0"/>
+              <a:cs typeface="Arial" panose="020B0604020202020204" pitchFamily="34" charset="0"/>
+            </a:endParaRPr>
+          </a:p>
+        </p:txBody>
+      </p:sp>
     </p:spTree>
     <p:extLst>
       <p:ext uri="{BB962C8B-B14F-4D97-AF65-F5344CB8AC3E}">
-        <p14:creationId xmlns:p14="http://schemas.microsoft.com/office/powerpoint/2010/main" val="707650836"/>
+        <p14:creationId xmlns:p14="http://schemas.microsoft.com/office/powerpoint/2010/main" val="1534157047"/>
       </p:ext>
     </p:extLst>
   </p:cSld>
   <p:clrMapOvr>
     <a:masterClrMapping/>
   </p:clrMapOvr>
+  <p:timing>
+    <p:tnLst>
+      <p:par>
+        <p:cTn id="1" dur="indefinite" restart="never" nodeType="tmRoot"/>
+      </p:par>
+    </p:tnLst>
+  </p:timing>
 </p:sld>
 </file>
 
@@ -4554,46 +5200,186 @@
           <a:chExt cx="0" cy="0"/>
         </a:xfrm>
       </p:grpSpPr>
+      <p:sp>
+        <p:nvSpPr>
+          <p:cNvPr id="2" name="TextBox 1"/>
+          <p:cNvSpPr txBox="1"/>
+          <p:nvPr/>
+        </p:nvSpPr>
+        <p:spPr>
+          <a:xfrm>
+            <a:off x="655389" y="144437"/>
+            <a:ext cx="11246412" cy="1446550"/>
+          </a:xfrm>
+          <a:prstGeom prst="rect">
+            <a:avLst/>
+          </a:prstGeom>
+          <a:noFill/>
+        </p:spPr>
+        <p:txBody>
+          <a:bodyPr wrap="none" rtlCol="0">
+            <a:spAutoFit/>
+          </a:bodyPr>
+          <a:lstStyle/>
+          <a:p>
+            <a:pPr algn="ctr"/>
+            <a:r>
+              <a:rPr lang="en-US" sz="4400" b="1">
+                <a:latin typeface="Arial" panose="020B0604020202020204" pitchFamily="34" charset="0"/>
+                <a:cs typeface="Arial" panose="020B0604020202020204" pitchFamily="34" charset="0"/>
+              </a:rPr>
+              <a:t>Visualizing iterations of </a:t>
+            </a:r>
+            <a:r>
+              <a:rPr lang="en-US" sz="4400" b="1">
+                <a:latin typeface="Arial" panose="020B0604020202020204" pitchFamily="34" charset="0"/>
+                <a:cs typeface="Arial" panose="020B0604020202020204" pitchFamily="34" charset="0"/>
+              </a:rPr>
+              <a:t>Kometa </a:t>
+            </a:r>
+            <a:r>
+              <a:rPr lang="en-US" sz="4400" b="1" smtClean="0">
+                <a:latin typeface="Arial" panose="020B0604020202020204" pitchFamily="34" charset="0"/>
+                <a:cs typeface="Arial" panose="020B0604020202020204" pitchFamily="34" charset="0"/>
+              </a:rPr>
+              <a:t>K-Means</a:t>
+            </a:r>
+          </a:p>
+          <a:p>
+            <a:pPr algn="ctr"/>
+            <a:r>
+              <a:rPr lang="en-US" sz="4400" b="1" smtClean="0">
+                <a:latin typeface="Arial" panose="020B0604020202020204" pitchFamily="34" charset="0"/>
+                <a:cs typeface="Arial" panose="020B0604020202020204" pitchFamily="34" charset="0"/>
+              </a:rPr>
+              <a:t>(Slow </a:t>
+            </a:r>
+            <a:r>
+              <a:rPr lang="en-US" sz="4400" b="1">
+                <a:latin typeface="Arial" panose="020B0604020202020204" pitchFamily="34" charset="0"/>
+                <a:cs typeface="Arial" panose="020B0604020202020204" pitchFamily="34" charset="0"/>
+              </a:rPr>
+              <a:t>K-Means)</a:t>
+            </a:r>
+          </a:p>
+        </p:txBody>
+      </p:sp>
+      <p:pic>
+        <p:nvPicPr>
+          <p:cNvPr id="3" name="Рисунок 2"/>
+          <p:cNvPicPr>
+            <a:picLocks noChangeAspect="1"/>
+          </p:cNvPicPr>
+          <p:nvPr/>
+        </p:nvPicPr>
+        <p:blipFill rotWithShape="1">
+          <a:blip r:embed="rId2"/>
+          <a:srcRect l="1411" t="5498" r="2436" b="8348"/>
+          <a:stretch/>
+        </p:blipFill>
+        <p:spPr>
+          <a:xfrm>
+            <a:off x="147516" y="1920240"/>
+            <a:ext cx="6131079" cy="3424920"/>
+          </a:xfrm>
+          <a:prstGeom prst="rect">
+            <a:avLst/>
+          </a:prstGeom>
+        </p:spPr>
+      </p:pic>
+      <p:pic>
+        <p:nvPicPr>
+          <p:cNvPr id="4" name="Рисунок 3"/>
+          <p:cNvPicPr>
+            <a:picLocks noChangeAspect="1"/>
+          </p:cNvPicPr>
+          <p:nvPr/>
+        </p:nvPicPr>
+        <p:blipFill rotWithShape="1">
+          <a:blip r:embed="rId3"/>
+          <a:srcRect l="1250" t="5260" r="2334" b="7185"/>
+          <a:stretch/>
+        </p:blipFill>
+        <p:spPr>
+          <a:xfrm>
+            <a:off x="6420333" y="1920240"/>
+            <a:ext cx="5571040" cy="3424920"/>
+          </a:xfrm>
+          <a:prstGeom prst="rect">
+            <a:avLst/>
+          </a:prstGeom>
+        </p:spPr>
+      </p:pic>
+      <p:sp>
+        <p:nvSpPr>
+          <p:cNvPr id="5" name="TextBox 4"/>
+          <p:cNvSpPr txBox="1"/>
+          <p:nvPr/>
+        </p:nvSpPr>
+        <p:spPr>
+          <a:xfrm>
+            <a:off x="3072384" y="5888736"/>
+            <a:ext cx="5626861" cy="584775"/>
+          </a:xfrm>
+          <a:prstGeom prst="rect">
+            <a:avLst/>
+          </a:prstGeom>
+          <a:noFill/>
+        </p:spPr>
+        <p:txBody>
+          <a:bodyPr wrap="none" rtlCol="0">
+            <a:spAutoFit/>
+          </a:bodyPr>
+          <a:lstStyle/>
+          <a:p>
+            <a:r>
+              <a:rPr lang="en-US" sz="3200">
+                <a:latin typeface="Arial" panose="020B0604020202020204" pitchFamily="34" charset="0"/>
+                <a:cs typeface="Arial" panose="020B0604020202020204" pitchFamily="34" charset="0"/>
+                <a:hlinkClick r:id="rId4"/>
+              </a:rPr>
+              <a:t>https</a:t>
+            </a:r>
+            <a:r>
+              <a:rPr lang="en-US" sz="3200">
+                <a:latin typeface="Arial" panose="020B0604020202020204" pitchFamily="34" charset="0"/>
+                <a:cs typeface="Arial" panose="020B0604020202020204" pitchFamily="34" charset="0"/>
+                <a:hlinkClick r:id="rId4"/>
+              </a:rPr>
+              <a:t>://</a:t>
+            </a:r>
+            <a:r>
+              <a:rPr lang="en-US" sz="3200" smtClean="0">
+                <a:latin typeface="Arial" panose="020B0604020202020204" pitchFamily="34" charset="0"/>
+                <a:cs typeface="Arial" panose="020B0604020202020204" pitchFamily="34" charset="0"/>
+                <a:hlinkClick r:id="rId4"/>
+              </a:rPr>
+              <a:t>youtu.be/HJFb86L-Nsg</a:t>
+            </a:r>
+            <a:endParaRPr lang="uk-UA" sz="3200">
+              <a:latin typeface="Arial" panose="020B0604020202020204" pitchFamily="34" charset="0"/>
+              <a:cs typeface="Arial" panose="020B0604020202020204" pitchFamily="34" charset="0"/>
+            </a:endParaRPr>
+          </a:p>
+        </p:txBody>
+      </p:sp>
     </p:spTree>
     <p:extLst>
       <p:ext uri="{BB962C8B-B14F-4D97-AF65-F5344CB8AC3E}">
-        <p14:creationId xmlns:p14="http://schemas.microsoft.com/office/powerpoint/2010/main" val="1534157047"/>
+        <p14:creationId xmlns:p14="http://schemas.microsoft.com/office/powerpoint/2010/main" val="707650836"/>
       </p:ext>
     </p:extLst>
   </p:cSld>
   <p:clrMapOvr>
     <a:masterClrMapping/>
   </p:clrMapOvr>
-</p:sld>
-</file>
-
-<file path=ppt/slides/slide19.xml><?xml version="1.0" encoding="utf-8"?>
-<p:sld xmlns:a="http://schemas.openxmlformats.org/drawingml/2006/main" xmlns:r="http://schemas.openxmlformats.org/officeDocument/2006/relationships" xmlns:p="http://schemas.openxmlformats.org/presentationml/2006/main">
-  <p:cSld>
-    <p:spTree>
-      <p:nvGrpSpPr>
-        <p:cNvPr id="1" name=""/>
-        <p:cNvGrpSpPr/>
-        <p:nvPr/>
-      </p:nvGrpSpPr>
-      <p:grpSpPr>
-        <a:xfrm>
-          <a:off x="0" y="0"/>
-          <a:ext cx="0" cy="0"/>
-          <a:chOff x="0" y="0"/>
-          <a:chExt cx="0" cy="0"/>
-        </a:xfrm>
-      </p:grpSpPr>
-    </p:spTree>
-    <p:extLst>
-      <p:ext uri="{BB962C8B-B14F-4D97-AF65-F5344CB8AC3E}">
-        <p14:creationId xmlns:p14="http://schemas.microsoft.com/office/powerpoint/2010/main" val="3380292919"/>
-      </p:ext>
-    </p:extLst>
-  </p:cSld>
-  <p:clrMapOvr>
-    <a:masterClrMapping/>
-  </p:clrMapOvr>
+  <p:timing>
+    <p:tnLst>
+      <p:par>
+        <p:cTn id="1" dur="indefinite" restart="never" nodeType="tmRoot"/>
+      </p:par>
+    </p:tnLst>
+  </p:timing>
 </p:sld>
 </file>
 
@@ -4744,6 +5530,59 @@
               </a:rPr>
               <a:t>3. Visualizing iterations of Kometa K-Means (Slow K-Means)</a:t>
             </a:r>
+          </a:p>
+        </p:txBody>
+      </p:sp>
+      <p:sp>
+        <p:nvSpPr>
+          <p:cNvPr id="5" name="TextBox 4"/>
+          <p:cNvSpPr txBox="1"/>
+          <p:nvPr/>
+        </p:nvSpPr>
+        <p:spPr>
+          <a:xfrm>
+            <a:off x="1926387" y="6029980"/>
+            <a:ext cx="8035405" cy="461665"/>
+          </a:xfrm>
+          <a:prstGeom prst="rect">
+            <a:avLst/>
+          </a:prstGeom>
+          <a:noFill/>
+        </p:spPr>
+        <p:txBody>
+          <a:bodyPr wrap="none" rtlCol="0">
+            <a:spAutoFit/>
+          </a:bodyPr>
+          <a:lstStyle/>
+          <a:p>
+            <a:r>
+              <a:rPr lang="en-US" sz="2400">
+                <a:latin typeface="Arial" panose="020B0604020202020204" pitchFamily="34" charset="0"/>
+                <a:cs typeface="Arial" panose="020B0604020202020204" pitchFamily="34" charset="0"/>
+                <a:hlinkClick r:id="rId3"/>
+              </a:rPr>
+              <a:t>https</a:t>
+            </a:r>
+            <a:r>
+              <a:rPr lang="en-US" sz="2400">
+                <a:latin typeface="Arial" panose="020B0604020202020204" pitchFamily="34" charset="0"/>
+                <a:cs typeface="Arial" panose="020B0604020202020204" pitchFamily="34" charset="0"/>
+                <a:hlinkClick r:id="rId3"/>
+              </a:rPr>
+              <a:t>://</a:t>
+            </a:r>
+            <a:r>
+              <a:rPr lang="en-US" sz="2400" smtClean="0">
+                <a:latin typeface="Arial" panose="020B0604020202020204" pitchFamily="34" charset="0"/>
+                <a:cs typeface="Arial" panose="020B0604020202020204" pitchFamily="34" charset="0"/>
+                <a:hlinkClick r:id="rId3"/>
+              </a:rPr>
+              <a:t>github.com/reeWorlds/ML_S4_labs/tree/main/Lab1</a:t>
+            </a:r>
+            <a:endParaRPr lang="uk-UA" sz="2400">
+              <a:latin typeface="Arial" panose="020B0604020202020204" pitchFamily="34" charset="0"/>
+              <a:cs typeface="Arial" panose="020B0604020202020204" pitchFamily="34" charset="0"/>
+            </a:endParaRPr>
           </a:p>
         </p:txBody>
       </p:sp>

</xml_diff>

<commit_message>
Fix typo in python file
</commit_message>
<xml_diff>
--- a/Lab1/Lab1.pptx
+++ b/Lab1/Lab1.pptx
@@ -4072,8 +4072,8 @@
         </p:nvSpPr>
         <p:spPr>
           <a:xfrm>
-            <a:off x="2085014" y="144437"/>
-            <a:ext cx="8478603" cy="1938992"/>
+            <a:off x="1402135" y="144437"/>
+            <a:ext cx="9844363" cy="1938992"/>
           </a:xfrm>
           <a:prstGeom prst="rect">
             <a:avLst/>
@@ -4092,7 +4092,21 @@
                 <a:latin typeface="Arial" panose="020B0604020202020204" pitchFamily="34" charset="0"/>
                 <a:cs typeface="Arial" panose="020B0604020202020204" pitchFamily="34" charset="0"/>
               </a:rPr>
-              <a:t>Out-of-box classifier</a:t>
+              <a:t>Out-of-box </a:t>
+            </a:r>
+            <a:r>
+              <a:rPr lang="en-US" sz="6000" b="1" smtClean="0">
+                <a:latin typeface="Arial" panose="020B0604020202020204" pitchFamily="34" charset="0"/>
+                <a:cs typeface="Arial" panose="020B0604020202020204" pitchFamily="34" charset="0"/>
+              </a:rPr>
+              <a:t>classifier</a:t>
+            </a:r>
+            <a:r>
+              <a:rPr lang="uk-UA" sz="6000" b="1" smtClean="0">
+                <a:latin typeface="Arial" panose="020B0604020202020204" pitchFamily="34" charset="0"/>
+                <a:cs typeface="Arial" panose="020B0604020202020204" pitchFamily="34" charset="0"/>
+              </a:rPr>
+              <a:t> (С++)</a:t>
             </a:r>
             <a:endParaRPr lang="uk-UA" sz="6000" b="1" smtClean="0">
               <a:latin typeface="Arial" panose="020B0604020202020204" pitchFamily="34" charset="0"/>
@@ -4568,8 +4582,26 @@
                 <a:latin typeface="Arial" panose="020B0604020202020204" pitchFamily="34" charset="0"/>
                 <a:cs typeface="Arial" panose="020B0604020202020204" pitchFamily="34" charset="0"/>
               </a:rPr>
-              <a:t>K-Means)</a:t>
-            </a:r>
+              <a:t>K-Means</a:t>
+            </a:r>
+            <a:r>
+              <a:rPr lang="en-US" sz="4400" b="1" smtClean="0">
+                <a:latin typeface="Arial" panose="020B0604020202020204" pitchFamily="34" charset="0"/>
+                <a:cs typeface="Arial" panose="020B0604020202020204" pitchFamily="34" charset="0"/>
+              </a:rPr>
+              <a:t>)</a:t>
+            </a:r>
+            <a:r>
+              <a:rPr lang="uk-UA" sz="4400" b="1" smtClean="0">
+                <a:latin typeface="Arial" panose="020B0604020202020204" pitchFamily="34" charset="0"/>
+                <a:cs typeface="Arial" panose="020B0604020202020204" pitchFamily="34" charset="0"/>
+              </a:rPr>
+              <a:t> (С++)</a:t>
+            </a:r>
+            <a:endParaRPr lang="en-US" sz="4400" b="1">
+              <a:latin typeface="Arial" panose="020B0604020202020204" pitchFamily="34" charset="0"/>
+              <a:cs typeface="Arial" panose="020B0604020202020204" pitchFamily="34" charset="0"/>
+            </a:endParaRPr>
           </a:p>
         </p:txBody>
       </p:sp>
@@ -4769,8 +4801,8 @@
           </a:p>
         </p:txBody>
       </p:sp>
-      <mc:AlternateContent xmlns:mc="http://schemas.openxmlformats.org/markup-compatibility/2006">
-        <mc:Choice xmlns:a14="http://schemas.microsoft.com/office/drawing/2010/main" Requires="a14">
+      <mc:AlternateContent xmlns:mc="http://schemas.openxmlformats.org/markup-compatibility/2006" xmlns:a14="http://schemas.microsoft.com/office/drawing/2010/main">
+        <mc:Choice Requires="a14">
           <p:sp>
             <p:nvSpPr>
               <p:cNvPr id="6" name="TextBox 5"/>
@@ -4809,14 +4841,7 @@
                     <a:latin typeface="Arial" panose="020B0604020202020204" pitchFamily="34" charset="0"/>
                     <a:cs typeface="Arial" panose="020B0604020202020204" pitchFamily="34" charset="0"/>
                   </a:rPr>
-                  <a:t>Let B = average of </a:t>
-                </a:r>
-                <a:r>
-                  <a:rPr lang="en-US" sz="2800" b="1" smtClean="0">
-                    <a:latin typeface="Arial" panose="020B0604020202020204" pitchFamily="34" charset="0"/>
-                    <a:cs typeface="Arial" panose="020B0604020202020204" pitchFamily="34" charset="0"/>
-                  </a:rPr>
-                  <a:t>c</a:t>
+                  <a:t>Let B = average of c</a:t>
                 </a:r>
                 <a:r>
                   <a:rPr lang="en-US" sz="2800" b="1">
@@ -4832,10 +4857,6 @@
                   </a:rPr>
                   <a:t>uster</a:t>
                 </a:r>
-                <a:endParaRPr lang="en-US" sz="2800" b="1" smtClean="0">
-                  <a:latin typeface="Arial" panose="020B0604020202020204" pitchFamily="34" charset="0"/>
-                  <a:cs typeface="Arial" panose="020B0604020202020204" pitchFamily="34" charset="0"/>
-                </a:endParaRPr>
               </a:p>
               <a:p>
                 <a:pPr algn="just"/>
@@ -5046,7 +5067,7 @@
             </p:txBody>
           </p:sp>
         </mc:Choice>
-        <mc:Fallback>
+        <mc:Fallback xmlns="">
           <p:sp>
             <p:nvSpPr>
               <p:cNvPr id="6" name="TextBox 5"/>

</xml_diff>

<commit_message>
Add presentation to lab2
</commit_message>
<xml_diff>
--- a/Lab1/Lab1.pptx
+++ b/Lab1/Lab1.pptx
@@ -260,7 +260,7 @@
           <a:p>
             <a:fld id="{2BA96F12-51F3-4FE2-9D31-5E73840F9E12}" type="datetimeFigureOut">
               <a:rPr lang="uk-UA" smtClean="0"/>
-              <a:t>06.04.2022</a:t>
+              <a:t>11.04.2022</a:t>
             </a:fld>
             <a:endParaRPr lang="uk-UA"/>
           </a:p>
@@ -430,7 +430,7 @@
           <a:p>
             <a:fld id="{2BA96F12-51F3-4FE2-9D31-5E73840F9E12}" type="datetimeFigureOut">
               <a:rPr lang="uk-UA" smtClean="0"/>
-              <a:t>06.04.2022</a:t>
+              <a:t>11.04.2022</a:t>
             </a:fld>
             <a:endParaRPr lang="uk-UA"/>
           </a:p>
@@ -610,7 +610,7 @@
           <a:p>
             <a:fld id="{2BA96F12-51F3-4FE2-9D31-5E73840F9E12}" type="datetimeFigureOut">
               <a:rPr lang="uk-UA" smtClean="0"/>
-              <a:t>06.04.2022</a:t>
+              <a:t>11.04.2022</a:t>
             </a:fld>
             <a:endParaRPr lang="uk-UA"/>
           </a:p>
@@ -780,7 +780,7 @@
           <a:p>
             <a:fld id="{2BA96F12-51F3-4FE2-9D31-5E73840F9E12}" type="datetimeFigureOut">
               <a:rPr lang="uk-UA" smtClean="0"/>
-              <a:t>06.04.2022</a:t>
+              <a:t>11.04.2022</a:t>
             </a:fld>
             <a:endParaRPr lang="uk-UA"/>
           </a:p>
@@ -1026,7 +1026,7 @@
           <a:p>
             <a:fld id="{2BA96F12-51F3-4FE2-9D31-5E73840F9E12}" type="datetimeFigureOut">
               <a:rPr lang="uk-UA" smtClean="0"/>
-              <a:t>06.04.2022</a:t>
+              <a:t>11.04.2022</a:t>
             </a:fld>
             <a:endParaRPr lang="uk-UA"/>
           </a:p>
@@ -1258,7 +1258,7 @@
           <a:p>
             <a:fld id="{2BA96F12-51F3-4FE2-9D31-5E73840F9E12}" type="datetimeFigureOut">
               <a:rPr lang="uk-UA" smtClean="0"/>
-              <a:t>06.04.2022</a:t>
+              <a:t>11.04.2022</a:t>
             </a:fld>
             <a:endParaRPr lang="uk-UA"/>
           </a:p>
@@ -1625,7 +1625,7 @@
           <a:p>
             <a:fld id="{2BA96F12-51F3-4FE2-9D31-5E73840F9E12}" type="datetimeFigureOut">
               <a:rPr lang="uk-UA" smtClean="0"/>
-              <a:t>06.04.2022</a:t>
+              <a:t>11.04.2022</a:t>
             </a:fld>
             <a:endParaRPr lang="uk-UA"/>
           </a:p>
@@ -1743,7 +1743,7 @@
           <a:p>
             <a:fld id="{2BA96F12-51F3-4FE2-9D31-5E73840F9E12}" type="datetimeFigureOut">
               <a:rPr lang="uk-UA" smtClean="0"/>
-              <a:t>06.04.2022</a:t>
+              <a:t>11.04.2022</a:t>
             </a:fld>
             <a:endParaRPr lang="uk-UA"/>
           </a:p>
@@ -1838,7 +1838,7 @@
           <a:p>
             <a:fld id="{2BA96F12-51F3-4FE2-9D31-5E73840F9E12}" type="datetimeFigureOut">
               <a:rPr lang="uk-UA" smtClean="0"/>
-              <a:t>06.04.2022</a:t>
+              <a:t>11.04.2022</a:t>
             </a:fld>
             <a:endParaRPr lang="uk-UA"/>
           </a:p>
@@ -2115,7 +2115,7 @@
           <a:p>
             <a:fld id="{2BA96F12-51F3-4FE2-9D31-5E73840F9E12}" type="datetimeFigureOut">
               <a:rPr lang="uk-UA" smtClean="0"/>
-              <a:t>06.04.2022</a:t>
+              <a:t>11.04.2022</a:t>
             </a:fld>
             <a:endParaRPr lang="uk-UA"/>
           </a:p>
@@ -2368,7 +2368,7 @@
           <a:p>
             <a:fld id="{2BA96F12-51F3-4FE2-9D31-5E73840F9E12}" type="datetimeFigureOut">
               <a:rPr lang="uk-UA" smtClean="0"/>
-              <a:t>06.04.2022</a:t>
+              <a:t>11.04.2022</a:t>
             </a:fld>
             <a:endParaRPr lang="uk-UA"/>
           </a:p>
@@ -2581,7 +2581,7 @@
           <a:p>
             <a:fld id="{2BA96F12-51F3-4FE2-9D31-5E73840F9E12}" type="datetimeFigureOut">
               <a:rPr lang="uk-UA" smtClean="0"/>
-              <a:t>06.04.2022</a:t>
+              <a:t>11.04.2022</a:t>
             </a:fld>
             <a:endParaRPr lang="uk-UA"/>
           </a:p>
@@ -4092,14 +4092,7 @@
                 <a:latin typeface="Arial" panose="020B0604020202020204" pitchFamily="34" charset="0"/>
                 <a:cs typeface="Arial" panose="020B0604020202020204" pitchFamily="34" charset="0"/>
               </a:rPr>
-              <a:t>Out-of-box </a:t>
-            </a:r>
-            <a:r>
-              <a:rPr lang="en-US" sz="6000" b="1" smtClean="0">
-                <a:latin typeface="Arial" panose="020B0604020202020204" pitchFamily="34" charset="0"/>
-                <a:cs typeface="Arial" panose="020B0604020202020204" pitchFamily="34" charset="0"/>
-              </a:rPr>
-              <a:t>classifier</a:t>
+              <a:t>Out-of-box classifier</a:t>
             </a:r>
             <a:r>
               <a:rPr lang="uk-UA" sz="6000" b="1" smtClean="0">
@@ -4108,10 +4101,6 @@
               </a:rPr>
               <a:t> (С++)</a:t>
             </a:r>
-            <a:endParaRPr lang="uk-UA" sz="6000" b="1" smtClean="0">
-              <a:latin typeface="Arial" panose="020B0604020202020204" pitchFamily="34" charset="0"/>
-              <a:cs typeface="Arial" panose="020B0604020202020204" pitchFamily="34" charset="0"/>
-            </a:endParaRPr>
           </a:p>
           <a:p>
             <a:pPr algn="ctr"/>

</xml_diff>